<commit_message>
chapter09: split funcion withdraw money
</commit_message>
<xml_diff>
--- a/Chapter09/Dapp.pptx
+++ b/Chapter09/Dapp.pptx
@@ -212,7 +212,7 @@
           <a:p>
             <a:fld id="{FA90EC1C-D305-4D94-A551-D43A0AC1DF1E}" type="datetimeFigureOut">
               <a:rPr lang="en-US" smtClean="0"/>
-              <a:t>30 Oct 2021</a:t>
+              <a:t>02 Nov 2021</a:t>
             </a:fld>
             <a:endParaRPr lang="en-US"/>
           </a:p>
@@ -555,6 +555,90 @@
     <p:extLst>
       <p:ext uri="{BB962C8B-B14F-4D97-AF65-F5344CB8AC3E}">
         <p14:creationId xmlns:p14="http://schemas.microsoft.com/office/powerpoint/2010/main" val="1012592186"/>
+      </p:ext>
+    </p:extLst>
+  </p:cSld>
+  <p:clrMapOvr>
+    <a:masterClrMapping/>
+  </p:clrMapOvr>
+</p:notes>
+</file>
+
+<file path=ppt/notesSlides/notesSlide2.xml><?xml version="1.0" encoding="utf-8"?>
+<p:notes xmlns:a="http://schemas.openxmlformats.org/drawingml/2006/main" xmlns:r="http://schemas.openxmlformats.org/officeDocument/2006/relationships" xmlns:p="http://schemas.openxmlformats.org/presentationml/2006/main">
+  <p:cSld>
+    <p:spTree>
+      <p:nvGrpSpPr>
+        <p:cNvPr id="1" name=""/>
+        <p:cNvGrpSpPr/>
+        <p:nvPr/>
+      </p:nvGrpSpPr>
+      <p:grpSpPr>
+        <a:xfrm>
+          <a:off x="0" y="0"/>
+          <a:ext cx="0" cy="0"/>
+          <a:chOff x="0" y="0"/>
+          <a:chExt cx="0" cy="0"/>
+        </a:xfrm>
+      </p:grpSpPr>
+      <p:sp>
+        <p:nvSpPr>
+          <p:cNvPr id="2" name="Chỗ dành sẵn cho Hình ảnh của Bản chiếu 1"/>
+          <p:cNvSpPr>
+            <a:spLocks noGrp="1" noRot="1" noChangeAspect="1"/>
+          </p:cNvSpPr>
+          <p:nvPr>
+            <p:ph type="sldImg"/>
+          </p:nvPr>
+        </p:nvSpPr>
+        <p:spPr/>
+      </p:sp>
+      <p:sp>
+        <p:nvSpPr>
+          <p:cNvPr id="3" name="Chỗ dành sẵn cho Ghi chú 2"/>
+          <p:cNvSpPr>
+            <a:spLocks noGrp="1"/>
+          </p:cNvSpPr>
+          <p:nvPr>
+            <p:ph type="body" idx="1"/>
+          </p:nvPr>
+        </p:nvSpPr>
+        <p:spPr/>
+        <p:txBody>
+          <a:bodyPr/>
+          <a:lstStyle/>
+          <a:p>
+            <a:endParaRPr lang="en-US"/>
+          </a:p>
+        </p:txBody>
+      </p:sp>
+      <p:sp>
+        <p:nvSpPr>
+          <p:cNvPr id="4" name="Chỗ dành sẵn cho Số hiệu Bản chiếu 3"/>
+          <p:cNvSpPr>
+            <a:spLocks noGrp="1"/>
+          </p:cNvSpPr>
+          <p:nvPr>
+            <p:ph type="sldNum" sz="quarter" idx="10"/>
+          </p:nvPr>
+        </p:nvSpPr>
+        <p:spPr/>
+        <p:txBody>
+          <a:bodyPr/>
+          <a:lstStyle/>
+          <a:p>
+            <a:fld id="{24107E0F-6336-488B-8BDC-65F3472C72CA}" type="slidenum">
+              <a:rPr lang="en-US" smtClean="0"/>
+              <a:t>4</a:t>
+            </a:fld>
+            <a:endParaRPr lang="en-US"/>
+          </a:p>
+        </p:txBody>
+      </p:sp>
+    </p:spTree>
+    <p:extLst>
+      <p:ext uri="{BB962C8B-B14F-4D97-AF65-F5344CB8AC3E}">
+        <p14:creationId xmlns:p14="http://schemas.microsoft.com/office/powerpoint/2010/main" val="1697685687"/>
       </p:ext>
     </p:extLst>
   </p:cSld>
@@ -6736,7 +6820,7 @@
         </p:nvSpPr>
         <p:spPr>
           <a:xfrm>
-            <a:off x="1807450" y="-15638"/>
+            <a:off x="1776009" y="-6653"/>
             <a:ext cx="4276718" cy="5165964"/>
           </a:xfrm>
           <a:prstGeom prst="triangle">
@@ -7563,19 +7647,7 @@
                 </a:solidFill>
                 <a:cs typeface="Arial" pitchFamily="34" charset="0"/>
               </a:rPr>
-              <a:t>Thêm vài chức năng bổ </a:t>
-            </a:r>
-            <a:r>
-              <a:rPr lang="en-US" altLang="ko-KR" sz="1400" b="1" smtClean="0">
-                <a:solidFill>
-                  <a:schemeClr val="tx1">
-                    <a:lumMod val="75000"/>
-                    <a:lumOff val="25000"/>
-                  </a:schemeClr>
-                </a:solidFill>
-                <a:cs typeface="Arial" pitchFamily="34" charset="0"/>
-              </a:rPr>
-              <a:t>sung, use-case</a:t>
+              <a:t>Khai triển trên phiên bản solidity 0.8.9</a:t>
             </a:r>
             <a:endParaRPr lang="ko-KR" altLang="en-US" sz="1400" b="1" dirty="0">
               <a:solidFill>
@@ -7598,6 +7670,398 @@
         <p:spPr>
           <a:xfrm>
             <a:off x="4177709" y="3421122"/>
+            <a:ext cx="4146430" cy="307777"/>
+          </a:xfrm>
+          <a:prstGeom prst="rect">
+            <a:avLst/>
+          </a:prstGeom>
+          <a:noFill/>
+        </p:spPr>
+        <p:txBody>
+          <a:bodyPr wrap="square" rtlCol="0">
+            <a:spAutoFit/>
+          </a:bodyPr>
+          <a:lstStyle/>
+          <a:p>
+            <a:r>
+              <a:rPr lang="en-US" altLang="ko-KR" sz="1400" b="1" smtClean="0">
+                <a:solidFill>
+                  <a:schemeClr val="tx1">
+                    <a:lumMod val="75000"/>
+                    <a:lumOff val="25000"/>
+                  </a:schemeClr>
+                </a:solidFill>
+                <a:cs typeface="Arial" pitchFamily="34" charset="0"/>
+              </a:rPr>
+              <a:t>Import OpenZeppenlin v4.4 </a:t>
+            </a:r>
+            <a:endParaRPr lang="ko-KR" altLang="en-US" sz="1400" b="1" dirty="0">
+              <a:solidFill>
+                <a:schemeClr val="tx1">
+                  <a:lumMod val="75000"/>
+                  <a:lumOff val="25000"/>
+                </a:schemeClr>
+              </a:solidFill>
+              <a:cs typeface="Arial" pitchFamily="34" charset="0"/>
+            </a:endParaRPr>
+          </a:p>
+        </p:txBody>
+      </p:sp>
+      <p:grpSp>
+        <p:nvGrpSpPr>
+          <p:cNvPr id="36" name="Group 17"/>
+          <p:cNvGrpSpPr/>
+          <p:nvPr/>
+        </p:nvGrpSpPr>
+        <p:grpSpPr>
+          <a:xfrm>
+            <a:off x="2735028" y="4006394"/>
+            <a:ext cx="5328592" cy="755937"/>
+            <a:chOff x="3414539" y="1203598"/>
+            <a:chExt cx="5328592" cy="755937"/>
+          </a:xfrm>
+        </p:grpSpPr>
+        <p:grpSp>
+          <p:nvGrpSpPr>
+            <p:cNvPr id="37" name="Group 18"/>
+            <p:cNvGrpSpPr/>
+            <p:nvPr/>
+          </p:nvGrpSpPr>
+          <p:grpSpPr>
+            <a:xfrm>
+              <a:off x="3414539" y="1203598"/>
+              <a:ext cx="3816400" cy="576064"/>
+              <a:chOff x="4572000" y="1743933"/>
+              <a:chExt cx="3816400" cy="576064"/>
+            </a:xfrm>
+            <a:solidFill>
+              <a:srgbClr val="FFC000"/>
+            </a:solidFill>
+          </p:grpSpPr>
+          <p:sp>
+            <p:nvSpPr>
+              <p:cNvPr id="41" name="Rectangle 22"/>
+              <p:cNvSpPr/>
+              <p:nvPr/>
+            </p:nvSpPr>
+            <p:spPr>
+              <a:xfrm>
+                <a:off x="4788024" y="1743933"/>
+                <a:ext cx="3384376" cy="576064"/>
+              </a:xfrm>
+              <a:prstGeom prst="rect">
+                <a:avLst/>
+              </a:prstGeom>
+              <a:solidFill>
+                <a:schemeClr val="accent2"/>
+              </a:solidFill>
+              <a:ln>
+                <a:noFill/>
+              </a:ln>
+            </p:spPr>
+            <p:style>
+              <a:lnRef idx="2">
+                <a:schemeClr val="accent1">
+                  <a:shade val="50000"/>
+                </a:schemeClr>
+              </a:lnRef>
+              <a:fillRef idx="1">
+                <a:schemeClr val="accent1"/>
+              </a:fillRef>
+              <a:effectRef idx="0">
+                <a:schemeClr val="accent1"/>
+              </a:effectRef>
+              <a:fontRef idx="minor">
+                <a:schemeClr val="lt1"/>
+              </a:fontRef>
+            </p:style>
+            <p:txBody>
+              <a:bodyPr rtlCol="0" anchor="ctr"/>
+              <a:lstStyle/>
+              <a:p>
+                <a:pPr algn="ctr"/>
+                <a:endParaRPr lang="ko-KR" altLang="en-US">
+                  <a:solidFill>
+                    <a:schemeClr val="tx1"/>
+                  </a:solidFill>
+                </a:endParaRPr>
+              </a:p>
+            </p:txBody>
+          </p:sp>
+          <p:sp>
+            <p:nvSpPr>
+              <p:cNvPr id="44" name="Isosceles Triangle 23"/>
+              <p:cNvSpPr/>
+              <p:nvPr/>
+            </p:nvSpPr>
+            <p:spPr>
+              <a:xfrm rot="16200000">
+                <a:off x="4392000" y="1923934"/>
+                <a:ext cx="576000" cy="216000"/>
+              </a:xfrm>
+              <a:prstGeom prst="triangle">
+                <a:avLst>
+                  <a:gd name="adj" fmla="val 0"/>
+                </a:avLst>
+              </a:prstGeom>
+              <a:solidFill>
+                <a:schemeClr val="accent2"/>
+              </a:solidFill>
+              <a:ln>
+                <a:noFill/>
+              </a:ln>
+            </p:spPr>
+            <p:style>
+              <a:lnRef idx="2">
+                <a:schemeClr val="accent1">
+                  <a:shade val="50000"/>
+                </a:schemeClr>
+              </a:lnRef>
+              <a:fillRef idx="1">
+                <a:schemeClr val="accent1"/>
+              </a:fillRef>
+              <a:effectRef idx="0">
+                <a:schemeClr val="accent1"/>
+              </a:effectRef>
+              <a:fontRef idx="minor">
+                <a:schemeClr val="lt1"/>
+              </a:fontRef>
+            </p:style>
+            <p:txBody>
+              <a:bodyPr rtlCol="0" anchor="ctr"/>
+              <a:lstStyle/>
+              <a:p>
+                <a:pPr algn="ctr"/>
+                <a:endParaRPr lang="ko-KR" altLang="en-US">
+                  <a:solidFill>
+                    <a:schemeClr val="tx1"/>
+                  </a:solidFill>
+                </a:endParaRPr>
+              </a:p>
+            </p:txBody>
+          </p:sp>
+          <p:sp>
+            <p:nvSpPr>
+              <p:cNvPr id="45" name="Isosceles Triangle 24"/>
+              <p:cNvSpPr/>
+              <p:nvPr/>
+            </p:nvSpPr>
+            <p:spPr>
+              <a:xfrm rot="5400000">
+                <a:off x="7992400" y="1923933"/>
+                <a:ext cx="576000" cy="216000"/>
+              </a:xfrm>
+              <a:prstGeom prst="triangle">
+                <a:avLst>
+                  <a:gd name="adj" fmla="val 0"/>
+                </a:avLst>
+              </a:prstGeom>
+              <a:solidFill>
+                <a:schemeClr val="accent2"/>
+              </a:solidFill>
+              <a:ln>
+                <a:noFill/>
+              </a:ln>
+            </p:spPr>
+            <p:style>
+              <a:lnRef idx="2">
+                <a:schemeClr val="accent1">
+                  <a:shade val="50000"/>
+                </a:schemeClr>
+              </a:lnRef>
+              <a:fillRef idx="1">
+                <a:schemeClr val="accent1"/>
+              </a:fillRef>
+              <a:effectRef idx="0">
+                <a:schemeClr val="accent1"/>
+              </a:effectRef>
+              <a:fontRef idx="minor">
+                <a:schemeClr val="lt1"/>
+              </a:fontRef>
+            </p:style>
+            <p:txBody>
+              <a:bodyPr rtlCol="0" anchor="ctr"/>
+              <a:lstStyle/>
+              <a:p>
+                <a:pPr algn="ctr"/>
+                <a:endParaRPr lang="ko-KR" altLang="en-US">
+                  <a:solidFill>
+                    <a:schemeClr val="tx1"/>
+                  </a:solidFill>
+                </a:endParaRPr>
+              </a:p>
+            </p:txBody>
+          </p:sp>
+        </p:grpSp>
+        <p:grpSp>
+          <p:nvGrpSpPr>
+            <p:cNvPr id="38" name="Group 19"/>
+            <p:cNvGrpSpPr/>
+            <p:nvPr/>
+          </p:nvGrpSpPr>
+          <p:grpSpPr>
+            <a:xfrm>
+              <a:off x="4314639" y="1383471"/>
+              <a:ext cx="4428492" cy="576064"/>
+              <a:chOff x="4572000" y="1743934"/>
+              <a:chExt cx="4428492" cy="576064"/>
+            </a:xfrm>
+            <a:solidFill>
+              <a:schemeClr val="bg1">
+                <a:lumMod val="95000"/>
+              </a:schemeClr>
+            </a:solidFill>
+          </p:grpSpPr>
+          <p:sp>
+            <p:nvSpPr>
+              <p:cNvPr id="39" name="Rectangle 20"/>
+              <p:cNvSpPr/>
+              <p:nvPr/>
+            </p:nvSpPr>
+            <p:spPr>
+              <a:xfrm>
+                <a:off x="4788024" y="1743934"/>
+                <a:ext cx="4212468" cy="576064"/>
+              </a:xfrm>
+              <a:prstGeom prst="rect">
+                <a:avLst/>
+              </a:prstGeom>
+              <a:grpFill/>
+              <a:ln>
+                <a:noFill/>
+              </a:ln>
+            </p:spPr>
+            <p:style>
+              <a:lnRef idx="2">
+                <a:schemeClr val="accent1">
+                  <a:shade val="50000"/>
+                </a:schemeClr>
+              </a:lnRef>
+              <a:fillRef idx="1">
+                <a:schemeClr val="accent1"/>
+              </a:fillRef>
+              <a:effectRef idx="0">
+                <a:schemeClr val="accent1"/>
+              </a:effectRef>
+              <a:fontRef idx="minor">
+                <a:schemeClr val="lt1"/>
+              </a:fontRef>
+            </p:style>
+            <p:txBody>
+              <a:bodyPr rtlCol="0" anchor="ctr"/>
+              <a:lstStyle/>
+              <a:p>
+                <a:pPr algn="ctr"/>
+                <a:endParaRPr lang="ko-KR" altLang="en-US">
+                  <a:solidFill>
+                    <a:schemeClr val="tx1"/>
+                  </a:solidFill>
+                </a:endParaRPr>
+              </a:p>
+            </p:txBody>
+          </p:sp>
+          <p:sp>
+            <p:nvSpPr>
+              <p:cNvPr id="40" name="Isosceles Triangle 21"/>
+              <p:cNvSpPr/>
+              <p:nvPr/>
+            </p:nvSpPr>
+            <p:spPr>
+              <a:xfrm rot="16200000">
+                <a:off x="4392000" y="1923934"/>
+                <a:ext cx="576000" cy="216000"/>
+              </a:xfrm>
+              <a:prstGeom prst="triangle">
+                <a:avLst>
+                  <a:gd name="adj" fmla="val 0"/>
+                </a:avLst>
+              </a:prstGeom>
+              <a:grpFill/>
+              <a:ln>
+                <a:noFill/>
+              </a:ln>
+            </p:spPr>
+            <p:style>
+              <a:lnRef idx="2">
+                <a:schemeClr val="accent1">
+                  <a:shade val="50000"/>
+                </a:schemeClr>
+              </a:lnRef>
+              <a:fillRef idx="1">
+                <a:schemeClr val="accent1"/>
+              </a:fillRef>
+              <a:effectRef idx="0">
+                <a:schemeClr val="accent1"/>
+              </a:effectRef>
+              <a:fontRef idx="minor">
+                <a:schemeClr val="lt1"/>
+              </a:fontRef>
+            </p:style>
+            <p:txBody>
+              <a:bodyPr rtlCol="0" anchor="ctr"/>
+              <a:lstStyle/>
+              <a:p>
+                <a:pPr algn="ctr"/>
+                <a:endParaRPr lang="ko-KR" altLang="en-US">
+                  <a:solidFill>
+                    <a:schemeClr val="tx1"/>
+                  </a:solidFill>
+                </a:endParaRPr>
+              </a:p>
+            </p:txBody>
+          </p:sp>
+        </p:grpSp>
+      </p:grpSp>
+      <p:sp>
+        <p:nvSpPr>
+          <p:cNvPr id="46" name="TextBox 42"/>
+          <p:cNvSpPr txBox="1"/>
+          <p:nvPr/>
+        </p:nvSpPr>
+        <p:spPr>
+          <a:xfrm>
+            <a:off x="2955673" y="4063561"/>
+            <a:ext cx="608526" cy="461665"/>
+          </a:xfrm>
+          <a:prstGeom prst="rect">
+            <a:avLst/>
+          </a:prstGeom>
+          <a:noFill/>
+        </p:spPr>
+        <p:txBody>
+          <a:bodyPr wrap="square" rtlCol="0">
+            <a:spAutoFit/>
+          </a:bodyPr>
+          <a:lstStyle/>
+          <a:p>
+            <a:pPr algn="ctr"/>
+            <a:r>
+              <a:rPr lang="en-US" altLang="ko-KR" sz="2400" b="1" smtClean="0">
+                <a:solidFill>
+                  <a:schemeClr val="bg1"/>
+                </a:solidFill>
+                <a:cs typeface="Arial" pitchFamily="34" charset="0"/>
+              </a:rPr>
+              <a:t>03</a:t>
+            </a:r>
+            <a:endParaRPr lang="ko-KR" altLang="en-US" sz="2400" b="1" dirty="0">
+              <a:solidFill>
+                <a:schemeClr val="bg1"/>
+              </a:solidFill>
+              <a:cs typeface="Arial" pitchFamily="34" charset="0"/>
+            </a:endParaRPr>
+          </a:p>
+        </p:txBody>
+      </p:sp>
+      <p:sp>
+        <p:nvSpPr>
+          <p:cNvPr id="48" name="TextBox 50"/>
+          <p:cNvSpPr txBox="1"/>
+          <p:nvPr/>
+        </p:nvSpPr>
+        <p:spPr>
+          <a:xfrm>
+            <a:off x="3851128" y="4329868"/>
             <a:ext cx="4146430" cy="307777"/>
           </a:xfrm>
           <a:prstGeom prst="rect">
@@ -8210,46 +8674,57 @@
       </p:sp>
       <p:graphicFrame>
         <p:nvGraphicFramePr>
-          <p:cNvPr id="4" name="Bảng 3"/>
+          <p:cNvPr id="5" name="Bảng 4"/>
           <p:cNvGraphicFramePr>
             <a:graphicFrameLocks noGrp="1"/>
           </p:cNvGraphicFramePr>
           <p:nvPr>
             <p:extLst>
               <p:ext uri="{D42A27DB-BD31-4B8C-83A1-F6EECF244321}">
-                <p14:modId xmlns:p14="http://schemas.microsoft.com/office/powerpoint/2010/main" val="114709144"/>
+                <p14:modId xmlns:p14="http://schemas.microsoft.com/office/powerpoint/2010/main" val="2190966564"/>
               </p:ext>
             </p:extLst>
           </p:nvPr>
         </p:nvGraphicFramePr>
         <p:xfrm>
-          <a:off x="323528" y="1491630"/>
-          <a:ext cx="8568952" cy="2574032"/>
+          <a:off x="611560" y="1131591"/>
+          <a:ext cx="8208912" cy="3116543"/>
         </p:xfrm>
         <a:graphic>
           <a:graphicData uri="http://schemas.openxmlformats.org/drawingml/2006/table">
             <a:tbl>
               <a:tblPr firstRow="1" bandRow="1">
-                <a:tableStyleId>{5C22544A-7EE6-4342-B048-85BDC9FD1C3A}</a:tableStyleId>
+                <a:tableStyleId>{7DF18680-E054-41AD-8BC1-D1AEF772440D}</a:tableStyleId>
               </a:tblPr>
               <a:tblGrid>
-                <a:gridCol w="1008112"/>
                 <a:gridCol w="1584176"/>
-                <a:gridCol w="5976664"/>
+                <a:gridCol w="6624736"/>
               </a:tblGrid>
-              <a:tr h="288032">
+              <a:tr h="274717">
                 <a:tc>
                   <a:txBody>
                     <a:bodyPr/>
                     <a:lstStyle/>
                     <a:p>
                       <a:r>
-                        <a:rPr lang="en-US" sz="1100" kern="1200" smtClean="0">
+                        <a:rPr lang="en-US" sz="1200" kern="1200" smtClean="0">
                           <a:effectLst/>
                         </a:rPr>
-                        <a:t>Keywords </a:t>
+                        <a:t>Từ</a:t>
                       </a:r>
-                      <a:endParaRPr lang="en-US" sz="1100" b="1"/>
+                      <a:r>
+                        <a:rPr lang="en-US" sz="1200" kern="1200" baseline="0" smtClean="0">
+                          <a:effectLst/>
+                        </a:rPr>
+                        <a:t> khóa</a:t>
+                      </a:r>
+                      <a:r>
+                        <a:rPr lang="en-US" sz="1200" kern="1200" smtClean="0">
+                          <a:effectLst/>
+                        </a:rPr>
+                        <a:t> </a:t>
+                      </a:r>
+                      <a:endParaRPr lang="en-US" sz="1200" b="1"/>
                     </a:p>
                   </a:txBody>
                   <a:tcPr/>
@@ -8260,44 +8735,30 @@
                     <a:lstStyle/>
                     <a:p>
                       <a:r>
-                        <a:rPr lang="en-US" sz="1100" smtClean="0"/>
-                        <a:t>Syntax</a:t>
+                        <a:rPr lang="en-US" sz="1200" smtClean="0"/>
+                        <a:t>Mô</a:t>
                       </a:r>
-                      <a:endParaRPr lang="en-US" sz="1100"/>
+                      <a:r>
+                        <a:rPr lang="en-US" sz="1200" baseline="0" smtClean="0"/>
+                        <a:t> tả</a:t>
+                      </a:r>
+                      <a:endParaRPr lang="en-US" sz="1200"/>
                     </a:p>
                   </a:txBody>
                   <a:tcPr/>
                 </a:tc>
+              </a:tr>
+              <a:tr h="700532">
                 <a:tc>
                   <a:txBody>
                     <a:bodyPr/>
                     <a:lstStyle/>
                     <a:p>
                       <a:r>
-                        <a:rPr lang="en-US" sz="1100" smtClean="0"/>
-                        <a:t>Description</a:t>
+                        <a:rPr lang="en-US" sz="1400" smtClean="0"/>
+                        <a:t>Fallback</a:t>
                       </a:r>
-                      <a:endParaRPr lang="en-US" sz="1100"/>
-                    </a:p>
-                  </a:txBody>
-                  <a:tcPr/>
-                </a:tc>
-              </a:tr>
-              <a:tr h="432048">
-                <a:tc rowSpan="2">
-                  <a:txBody>
-                    <a:bodyPr/>
-                    <a:lstStyle/>
-                    <a:p>
-                      <a:r>
-                        <a:rPr lang="en-US" sz="1100" smtClean="0"/>
-                        <a:t>event</a:t>
-                      </a:r>
-                      <a:r>
-                        <a:rPr lang="en-US" sz="1100" baseline="0" smtClean="0"/>
-                        <a:t>s</a:t>
-                      </a:r>
-                      <a:endParaRPr lang="en-US" sz="1100"/>
+                      <a:endParaRPr lang="en-US" sz="1400"/>
                     </a:p>
                   </a:txBody>
                   <a:tcPr anchor="ctr"/>
@@ -8308,88 +8769,104 @@
                     <a:lstStyle/>
                     <a:p>
                       <a:r>
-                        <a:rPr lang="en-US" sz="1100" smtClean="0"/>
-                        <a:t>event</a:t>
+                        <a:rPr lang="en-US" sz="1400" u="none" kern="1200" smtClean="0">
+                          <a:solidFill>
+                            <a:srgbClr val="C00000"/>
+                          </a:solidFill>
+                          <a:effectLst/>
+                        </a:rPr>
+                        <a:t>receive()</a:t>
                       </a:r>
                       <a:r>
-                        <a:rPr lang="en-US" sz="1100" baseline="0" smtClean="0"/>
-                        <a:t> eventName</a:t>
+                        <a:rPr lang="en-US" sz="1400" kern="1200" smtClean="0">
+                          <a:effectLst/>
+                        </a:rPr>
+                        <a:t> - cho calldata mà</a:t>
                       </a:r>
                       <a:r>
-                        <a:rPr lang="en-US" sz="1100" smtClean="0"/>
-                        <a:t>();</a:t>
+                        <a:rPr lang="en-US" sz="1400" kern="1200" baseline="0" smtClean="0">
+                          <a:effectLst/>
+                        </a:rPr>
+                        <a:t> không có kèm theo data nào </a:t>
                       </a:r>
-                      <a:endParaRPr lang="en-US" sz="1100"/>
-                    </a:p>
-                  </a:txBody>
-                  <a:tcPr anchor="ctr"/>
-                </a:tc>
-                <a:tc rowSpan="2">
-                  <a:txBody>
-                    <a:bodyPr/>
-                    <a:lstStyle/>
-                    <a:p>
-                      <a:pPr marL="0" indent="0">
-                        <a:buFontTx/>
-                        <a:buNone/>
-                      </a:pPr>
                       <a:r>
-                        <a:rPr lang="en-US" sz="1100" smtClean="0"/>
-                        <a:t>Events are inheritable members of contracts.</a:t>
+                        <a:rPr lang="en-US" sz="1400" kern="1200" smtClean="0">
+                          <a:effectLst/>
+                        </a:rPr>
+                        <a:t>(với</a:t>
+                      </a:r>
+                      <a:r>
+                        <a:rPr lang="en-US" sz="1400" kern="1200" baseline="0" smtClean="0">
+                          <a:effectLst/>
+                        </a:rPr>
+                        <a:t> </a:t>
+                      </a:r>
+                      <a:r>
+                        <a:rPr lang="en-US" sz="1400" kern="1200" smtClean="0">
+                          <a:effectLst/>
+                        </a:rPr>
+                        <a:t>value bất</a:t>
+                      </a:r>
+                      <a:r>
+                        <a:rPr lang="en-US" sz="1400" kern="1200" baseline="0" smtClean="0">
+                          <a:effectLst/>
+                        </a:rPr>
+                        <a:t> kỳ</a:t>
+                      </a:r>
+                      <a:r>
+                        <a:rPr lang="en-US" sz="1400" kern="1200" smtClean="0">
+                          <a:effectLst/>
+                        </a:rPr>
+                        <a:t>)</a:t>
                       </a:r>
                     </a:p>
                     <a:p>
-                      <a:pPr marL="0" indent="0">
-                        <a:buFontTx/>
-                        <a:buNone/>
-                      </a:pPr>
                       <a:r>
-                        <a:rPr lang="en-US" sz="1100" smtClean="0"/>
-                        <a:t>When you call them, they cause the arguments to be stored in the transaction’s log - a special</a:t>
+                        <a:rPr lang="en-US" sz="1400" u="none" strike="noStrike" kern="1200" smtClean="0">
+                          <a:solidFill>
+                            <a:srgbClr val="C00000"/>
+                          </a:solidFill>
+                          <a:effectLst/>
+                        </a:rPr>
+                        <a:t>fallback()</a:t>
                       </a:r>
-                    </a:p>
-                    <a:p>
-                      <a:pPr marL="0" indent="0">
-                        <a:buFontTx/>
-                        <a:buNone/>
-                      </a:pPr>
                       <a:r>
-                        <a:rPr lang="en-US" sz="1100" smtClean="0"/>
-                        <a:t>data structure in the blockchain.</a:t>
+                        <a:rPr lang="en-US" sz="1400" kern="1200" smtClean="0">
+                          <a:effectLst/>
+                        </a:rPr>
+                        <a:t> - cho</a:t>
                       </a:r>
-                    </a:p>
-                    <a:p>
-                      <a:pPr marL="0" indent="0" algn="just">
-                        <a:buFontTx/>
-                        <a:buNone/>
-                      </a:pPr>
                       <a:r>
-                        <a:rPr lang="en-US" sz="1100" smtClean="0"/>
-                        <a:t>These logs are associated with the address of the contract, are incorporated into the </a:t>
+                        <a:rPr lang="en-US" sz="1400" kern="1200" baseline="0" smtClean="0">
+                          <a:effectLst/>
+                        </a:rPr>
+                        <a:t> calldata có kèm theo data mà không có function nào phù hợp</a:t>
                       </a:r>
-                    </a:p>
-                    <a:p>
-                      <a:pPr marL="0" indent="0" algn="just">
-                        <a:buFontTx/>
-                        <a:buNone/>
-                      </a:pPr>
-                      <a:r>
-                        <a:rPr lang="en-US" sz="1100" smtClean="0"/>
-                        <a:t>blockchain, and stay there as long as a block is accessible.</a:t>
-                      </a:r>
-                      <a:endParaRPr lang="en-US" sz="1100" baseline="0" smtClean="0"/>
+                      <a:endParaRPr lang="en-US" sz="1400" b="0" i="0" kern="1200">
+                        <a:solidFill>
+                          <a:schemeClr val="dk1"/>
+                        </a:solidFill>
+                        <a:effectLst/>
+                        <a:latin typeface="+mn-lt"/>
+                        <a:ea typeface="+mn-ea"/>
+                        <a:cs typeface="+mn-cs"/>
+                      </a:endParaRPr>
                     </a:p>
                   </a:txBody>
                   <a:tcPr anchor="ctr"/>
                 </a:tc>
               </a:tr>
-              <a:tr h="244976">
-                <a:tc vMerge="1">
+              <a:tr h="458160">
+                <a:tc>
                   <a:txBody>
                     <a:bodyPr/>
                     <a:lstStyle/>
                     <a:p>
-                      <a:endParaRPr lang="en-US" sz="1100"/>
+                      <a:r>
+                        <a:rPr lang="en-US" sz="1400" smtClean="0"/>
+                        <a:t>OpenZeppenlin</a:t>
+                      </a:r>
+                      <a:endParaRPr lang="en-US" sz="1400"/>
                     </a:p>
                   </a:txBody>
                   <a:tcPr anchor="ctr"/>
@@ -8400,34 +8877,155 @@
                     <a:lstStyle/>
                     <a:p>
                       <a:r>
-                        <a:rPr lang="en-US" sz="1100" smtClean="0"/>
-                        <a:t>emit </a:t>
+                        <a:rPr lang="en-US" sz="1400" smtClean="0">
+                          <a:solidFill>
+                            <a:srgbClr val="C00000"/>
+                          </a:solidFill>
+                        </a:rPr>
+                        <a:t>Ownable.sol</a:t>
                       </a:r>
                       <a:r>
-                        <a:rPr lang="en-US" sz="1100" baseline="0" smtClean="0"/>
-                        <a:t>eventName</a:t>
+                        <a:rPr lang="en-US" sz="1400" baseline="0" smtClean="0">
+                          <a:solidFill>
+                            <a:srgbClr val="C00000"/>
+                          </a:solidFill>
+                        </a:rPr>
+                        <a:t> </a:t>
                       </a:r>
                       <a:r>
-                        <a:rPr lang="en-US" sz="1100" smtClean="0"/>
-                        <a:t>();</a:t>
+                        <a:rPr lang="en-US" sz="1400" baseline="0" smtClean="0"/>
+                        <a:t>– Bỏ function </a:t>
                       </a:r>
-                      <a:endParaRPr lang="en-US" sz="1100"/>
-                    </a:p>
-                  </a:txBody>
-                  <a:tcPr anchor="ctr"/>
-                </a:tc>
-                <a:tc vMerge="1">
-                  <a:txBody>
-                    <a:bodyPr/>
-                    <a:lstStyle/>
-                    <a:p>
-                      <a:endParaRPr lang="en-US" sz="1100"/>
+                      <a:r>
+                        <a:rPr lang="en-US" sz="1400" u="sng" baseline="0" smtClean="0"/>
+                        <a:t>isOwner()</a:t>
+                      </a:r>
                     </a:p>
                   </a:txBody>
                   <a:tcPr anchor="ctr"/>
                 </a:tc>
               </a:tr>
-              <a:tr h="211686">
+              <a:tr h="458160">
+                <a:tc>
+                  <a:txBody>
+                    <a:bodyPr/>
+                    <a:lstStyle/>
+                    <a:p>
+                      <a:r>
+                        <a:rPr lang="en-US" sz="1400" smtClean="0"/>
+                        <a:t>addAllowance</a:t>
+                      </a:r>
+                      <a:endParaRPr lang="en-US" sz="1400"/>
+                    </a:p>
+                  </a:txBody>
+                  <a:tcPr anchor="ctr"/>
+                </a:tc>
+                <a:tc>
+                  <a:txBody>
+                    <a:bodyPr/>
+                    <a:lstStyle/>
+                    <a:p>
+                      <a:r>
+                        <a:rPr lang="en-US" sz="1400" baseline="0" smtClean="0">
+                          <a:solidFill>
+                            <a:srgbClr val="C00000"/>
+                          </a:solidFill>
+                        </a:rPr>
+                        <a:t>ownerAddAllowance</a:t>
+                      </a:r>
+                      <a:r>
+                        <a:rPr lang="en-US" sz="1400" baseline="0" smtClean="0">
+                          <a:solidFill>
+                            <a:srgbClr val="C00000"/>
+                          </a:solidFill>
+                        </a:rPr>
+                        <a:t>() </a:t>
+                      </a:r>
+                      <a:r>
+                        <a:rPr lang="en-US" sz="1400" baseline="0" smtClean="0"/>
+                        <a:t>- Owner t</a:t>
+                      </a:r>
+                      <a:r>
+                        <a:rPr lang="en-US" sz="1400" smtClean="0"/>
+                        <a:t>hực</a:t>
+                      </a:r>
+                      <a:r>
+                        <a:rPr lang="en-US" sz="1400" baseline="0" smtClean="0"/>
+                        <a:t> </a:t>
+                      </a:r>
+                      <a:r>
+                        <a:rPr lang="en-US" sz="1400" baseline="0" smtClean="0"/>
+                        <a:t>hiện tăng/cộng thêm allowance </a:t>
+                      </a:r>
+                      <a:r>
+                        <a:rPr lang="en-US" sz="1400" baseline="0" smtClean="0"/>
+                        <a:t>của một </a:t>
+                      </a:r>
+                    </a:p>
+                    <a:p>
+                      <a:r>
+                        <a:rPr lang="en-US" sz="1400" baseline="0" smtClean="0"/>
+                        <a:t>address nào đó trong hợp đồng</a:t>
+                      </a:r>
+                      <a:endParaRPr lang="en-US" sz="1400"/>
+                    </a:p>
+                  </a:txBody>
+                  <a:tcPr anchor="ctr"/>
+                </a:tc>
+              </a:tr>
+              <a:tr h="646814">
+                <a:tc>
+                  <a:txBody>
+                    <a:bodyPr/>
+                    <a:lstStyle/>
+                    <a:p>
+                      <a:r>
+                        <a:rPr lang="en-US" sz="1400" smtClean="0"/>
+                        <a:t>reduceAllowance</a:t>
+                      </a:r>
+                      <a:endParaRPr lang="en-US" sz="1400"/>
+                    </a:p>
+                  </a:txBody>
+                  <a:tcPr anchor="ctr"/>
+                </a:tc>
+                <a:tc>
+                  <a:txBody>
+                    <a:bodyPr/>
+                    <a:lstStyle/>
+                    <a:p>
+                      <a:r>
+                        <a:rPr lang="en-US" sz="1400" baseline="0" smtClean="0">
+                          <a:solidFill>
+                            <a:srgbClr val="C00000"/>
+                          </a:solidFill>
+                        </a:rPr>
+                        <a:t>ownerReduceAllowance() </a:t>
+                      </a:r>
+                      <a:r>
+                        <a:rPr lang="en-US" sz="1400" baseline="0" smtClean="0"/>
+                        <a:t>- Owner t</a:t>
+                      </a:r>
+                      <a:r>
+                        <a:rPr lang="en-US" sz="1400" smtClean="0"/>
+                        <a:t>hực</a:t>
+                      </a:r>
+                      <a:r>
+                        <a:rPr lang="en-US" sz="1400" baseline="0" smtClean="0"/>
+                        <a:t> hiện trừ đi/giảm bớt allowance của một </a:t>
+                      </a:r>
+                    </a:p>
+                    <a:p>
+                      <a:r>
+                        <a:rPr lang="en-US" sz="1400" baseline="0" smtClean="0"/>
+                        <a:t>address nào đó trong hợp đồng</a:t>
+                      </a:r>
+                      <a:endParaRPr lang="en-US" sz="1400"/>
+                    </a:p>
+                  </a:txBody>
+                  <a:tcPr anchor="ctr"/>
+                </a:tc>
+              </a:tr>
+              <a:tr h="413945">
                 <a:tc>
                   <a:txBody>
                     <a:bodyPr/>
@@ -8451,18 +9049,12 @@
                         <a:defRPr/>
                       </a:pPr>
                       <a:r>
-                        <a:rPr lang="en-US" sz="1100" b="0" i="0" kern="1200" smtClean="0">
-                          <a:solidFill>
-                            <a:schemeClr val="dk1"/>
-                          </a:solidFill>
+                        <a:rPr lang="en-US" sz="1400" kern="1200" smtClean="0">
                           <a:effectLst/>
-                          <a:latin typeface="+mn-lt"/>
-                          <a:ea typeface="+mn-ea"/>
-                          <a:cs typeface="+mn-cs"/>
                         </a:rPr>
-                        <a:t>libraries</a:t>
+                        <a:t>withdrawMoney</a:t>
                       </a:r>
-                      <a:endParaRPr lang="en-US" sz="1100" b="0" i="0" kern="1200" smtClean="0">
+                      <a:endParaRPr lang="en-US" sz="1400" b="0" i="0" kern="1200" smtClean="0">
                         <a:solidFill>
                           <a:schemeClr val="lt1"/>
                         </a:solidFill>
@@ -8481,109 +9073,60 @@
                     <a:lstStyle/>
                     <a:p>
                       <a:r>
-                        <a:rPr lang="en-US" sz="1100" smtClean="0"/>
-                        <a:t>library</a:t>
+                        <a:rPr lang="en-US" sz="1400" smtClean="0">
+                          <a:solidFill>
+                            <a:srgbClr val="C00000"/>
+                          </a:solidFill>
+                        </a:rPr>
+                        <a:t>withdrawMoney() </a:t>
                       </a:r>
                       <a:r>
-                        <a:rPr lang="en-US" sz="1100" baseline="0" smtClean="0"/>
-                        <a:t> libraryName{}</a:t>
+                        <a:rPr lang="en-US" sz="1400" smtClean="0">
+                          <a:solidFill>
+                            <a:schemeClr val="tx1"/>
+                          </a:solidFill>
+                        </a:rPr>
+                        <a:t>-</a:t>
                       </a:r>
                       <a:r>
-                        <a:rPr lang="en-US" sz="1100" smtClean="0"/>
-                        <a:t>;</a:t>
-                      </a:r>
-                      <a:endParaRPr lang="en-US" sz="1100"/>
-                    </a:p>
-                  </a:txBody>
-                  <a:tcPr anchor="ctr"/>
-                </a:tc>
-                <a:tc>
-                  <a:txBody>
-                    <a:bodyPr/>
-                    <a:lstStyle/>
-                    <a:p>
-                      <a:r>
-                        <a:rPr lang="en-US" sz="1100" smtClean="0"/>
-                        <a:t>Libraries are similar to contracts, but their purpose is that they are deployed only once at a</a:t>
+                        <a:rPr lang="en-US" sz="1400" baseline="0" smtClean="0">
+                          <a:solidFill>
+                            <a:schemeClr val="tx1"/>
+                          </a:solidFill>
+                        </a:rPr>
+                        <a:t> Cho allowed thực hiện rút một lượng allowance đã được cấp</a:t>
                       </a:r>
                     </a:p>
                     <a:p>
                       <a:r>
-                        <a:rPr lang="en-US" sz="1100" smtClean="0"/>
-                        <a:t>specific address and their code is reused using the </a:t>
+                        <a:rPr lang="en-US" sz="1400" smtClean="0">
+                          <a:solidFill>
+                            <a:srgbClr val="C00000"/>
+                          </a:solidFill>
+                        </a:rPr>
+                        <a:t>ownerWithdrawMoney() </a:t>
                       </a:r>
                       <a:r>
-                        <a:rPr lang="en-US" sz="1100" i="0" u="none" smtClean="0"/>
-                        <a:t>DELEGATECALL</a:t>
+                        <a:rPr lang="en-US" sz="1400" smtClean="0">
+                          <a:solidFill>
+                            <a:schemeClr val="tx1"/>
+                          </a:solidFill>
+                        </a:rPr>
+                        <a:t>-</a:t>
                       </a:r>
                       <a:r>
-                        <a:rPr lang="en-US" sz="1100" smtClean="0"/>
-                        <a:t> (CALLCODE until</a:t>
+                        <a:rPr lang="en-US" sz="1400" baseline="0" smtClean="0">
+                          <a:solidFill>
+                            <a:schemeClr val="tx1"/>
+                          </a:solidFill>
+                        </a:rPr>
+                        <a:t> Cho Owner rút một phần hoặc toàn bộ balance contract</a:t>
                       </a:r>
-                    </a:p>
-                    <a:p>
-                      <a:r>
-                        <a:rPr lang="en-US" sz="1100" smtClean="0"/>
-                        <a:t>Homestead) feature of the EVM. </a:t>
-                      </a:r>
-                      <a:endParaRPr lang="en-US" sz="1100"/>
-                    </a:p>
-                  </a:txBody>
-                  <a:tcPr anchor="ctr"/>
-                </a:tc>
-              </a:tr>
-              <a:tr h="211686">
-                <a:tc gridSpan="2">
-                  <a:txBody>
-                    <a:bodyPr/>
-                    <a:lstStyle/>
-                    <a:p>
-                      <a:pPr algn="ctr"/>
-                      <a:r>
-                        <a:rPr lang="en-US" sz="1100" smtClean="0"/>
-                        <a:t>ABI</a:t>
-                      </a:r>
-                    </a:p>
-                  </a:txBody>
-                  <a:tcPr anchor="ctr"/>
-                </a:tc>
-                <a:tc hMerge="1">
-                  <a:txBody>
-                    <a:bodyPr/>
-                    <a:lstStyle/>
-                    <a:p>
-                      <a:endParaRPr lang="en-US" sz="1400"/>
-                    </a:p>
-                  </a:txBody>
-                  <a:tcPr anchor="ctr"/>
-                </a:tc>
-                <a:tc>
-                  <a:txBody>
-                    <a:bodyPr/>
-                    <a:lstStyle/>
-                    <a:p>
-                      <a:r>
-                        <a:rPr lang="en-US" sz="1100" smtClean="0"/>
-                        <a:t>The Contract Application Binary Interface (ABI) is the standard way to interact with contracts</a:t>
-                      </a:r>
-                    </a:p>
-                    <a:p>
-                      <a:r>
-                        <a:rPr lang="en-US" sz="1100" smtClean="0"/>
-                        <a:t>In the Ethereum ecosystem, both from outside the blockchain and for contract-to-contract</a:t>
-                      </a:r>
-                    </a:p>
-                    <a:p>
-                      <a:r>
-                        <a:rPr lang="en-US" sz="1100" smtClean="0"/>
-                        <a:t>interaction. Data is encoded according to its type, as described in this specification. </a:t>
-                      </a:r>
-                    </a:p>
-                    <a:p>
-                      <a:r>
-                        <a:rPr lang="en-US" sz="1100" smtClean="0"/>
-                        <a:t>The encoding is not self describing and thus requires a schema in order to decode.</a:t>
-                      </a:r>
+                      <a:endParaRPr lang="en-US" sz="1400">
+                        <a:solidFill>
+                          <a:srgbClr val="C00000"/>
+                        </a:solidFill>
+                      </a:endParaRPr>
                     </a:p>
                   </a:txBody>
                   <a:tcPr anchor="ctr"/>

</xml_diff>